<commit_message>
add to tumor example
</commit_message>
<xml_diff>
--- a/output/slides_2-14.pptx
+++ b/output/slides_2-14.pptx
@@ -5,7 +5,7 @@
     <p:sldMasterId id="2147483648" r:id="rId1"/>
   </p:sldMasterIdLst>
   <p:notesMasterIdLst>
-    <p:notesMasterId r:id="rId7"/>
+    <p:notesMasterId r:id="rId10"/>
   </p:notesMasterIdLst>
   <p:sldIdLst>
     <p:sldId id="256" r:id="rId2"/>
@@ -13,6 +13,9 @@
     <p:sldId id="259" r:id="rId4"/>
     <p:sldId id="258" r:id="rId5"/>
     <p:sldId id="260" r:id="rId6"/>
+    <p:sldId id="263" r:id="rId7"/>
+    <p:sldId id="261" r:id="rId8"/>
+    <p:sldId id="262" r:id="rId9"/>
   </p:sldIdLst>
   <p:sldSz cx="12192000" cy="6858000"/>
   <p:notesSz cx="6858000" cy="9144000"/>
@@ -201,7 +204,7 @@
           <a:p>
             <a:fld id="{A7574B48-CA84-491E-97B7-0C157DB9FB23}" type="datetimeFigureOut">
               <a:rPr lang="en-US" smtClean="0"/>
-              <a:t>2/12/2020</a:t>
+              <a:t>2/14/2020</a:t>
             </a:fld>
             <a:endParaRPr lang="en-US"/>
           </a:p>
@@ -615,7 +618,7 @@
           <a:p>
             <a:fld id="{99D6FCD8-25CF-486E-8539-B907BB6A0B30}" type="datetimeFigureOut">
               <a:rPr lang="en-US" smtClean="0"/>
-              <a:t>2/12/2020</a:t>
+              <a:t>2/14/2020</a:t>
             </a:fld>
             <a:endParaRPr lang="en-US"/>
           </a:p>
@@ -813,7 +816,7 @@
           <a:p>
             <a:fld id="{99D6FCD8-25CF-486E-8539-B907BB6A0B30}" type="datetimeFigureOut">
               <a:rPr lang="en-US" smtClean="0"/>
-              <a:t>2/12/2020</a:t>
+              <a:t>2/14/2020</a:t>
             </a:fld>
             <a:endParaRPr lang="en-US"/>
           </a:p>
@@ -1021,7 +1024,7 @@
           <a:p>
             <a:fld id="{99D6FCD8-25CF-486E-8539-B907BB6A0B30}" type="datetimeFigureOut">
               <a:rPr lang="en-US" smtClean="0"/>
-              <a:t>2/12/2020</a:t>
+              <a:t>2/14/2020</a:t>
             </a:fld>
             <a:endParaRPr lang="en-US"/>
           </a:p>
@@ -1219,7 +1222,7 @@
           <a:p>
             <a:fld id="{99D6FCD8-25CF-486E-8539-B907BB6A0B30}" type="datetimeFigureOut">
               <a:rPr lang="en-US" smtClean="0"/>
-              <a:t>2/12/2020</a:t>
+              <a:t>2/14/2020</a:t>
             </a:fld>
             <a:endParaRPr lang="en-US"/>
           </a:p>
@@ -1494,7 +1497,7 @@
           <a:p>
             <a:fld id="{99D6FCD8-25CF-486E-8539-B907BB6A0B30}" type="datetimeFigureOut">
               <a:rPr lang="en-US" smtClean="0"/>
-              <a:t>2/12/2020</a:t>
+              <a:t>2/14/2020</a:t>
             </a:fld>
             <a:endParaRPr lang="en-US"/>
           </a:p>
@@ -1759,7 +1762,7 @@
           <a:p>
             <a:fld id="{99D6FCD8-25CF-486E-8539-B907BB6A0B30}" type="datetimeFigureOut">
               <a:rPr lang="en-US" smtClean="0"/>
-              <a:t>2/12/2020</a:t>
+              <a:t>2/14/2020</a:t>
             </a:fld>
             <a:endParaRPr lang="en-US"/>
           </a:p>
@@ -2171,7 +2174,7 @@
           <a:p>
             <a:fld id="{99D6FCD8-25CF-486E-8539-B907BB6A0B30}" type="datetimeFigureOut">
               <a:rPr lang="en-US" smtClean="0"/>
-              <a:t>2/12/2020</a:t>
+              <a:t>2/14/2020</a:t>
             </a:fld>
             <a:endParaRPr lang="en-US"/>
           </a:p>
@@ -2312,7 +2315,7 @@
           <a:p>
             <a:fld id="{99D6FCD8-25CF-486E-8539-B907BB6A0B30}" type="datetimeFigureOut">
               <a:rPr lang="en-US" smtClean="0"/>
-              <a:t>2/12/2020</a:t>
+              <a:t>2/14/2020</a:t>
             </a:fld>
             <a:endParaRPr lang="en-US"/>
           </a:p>
@@ -2425,7 +2428,7 @@
           <a:p>
             <a:fld id="{99D6FCD8-25CF-486E-8539-B907BB6A0B30}" type="datetimeFigureOut">
               <a:rPr lang="en-US" smtClean="0"/>
-              <a:t>2/12/2020</a:t>
+              <a:t>2/14/2020</a:t>
             </a:fld>
             <a:endParaRPr lang="en-US"/>
           </a:p>
@@ -2736,7 +2739,7 @@
           <a:p>
             <a:fld id="{99D6FCD8-25CF-486E-8539-B907BB6A0B30}" type="datetimeFigureOut">
               <a:rPr lang="en-US" smtClean="0"/>
-              <a:t>2/12/2020</a:t>
+              <a:t>2/14/2020</a:t>
             </a:fld>
             <a:endParaRPr lang="en-US"/>
           </a:p>
@@ -3024,7 +3027,7 @@
           <a:p>
             <a:fld id="{99D6FCD8-25CF-486E-8539-B907BB6A0B30}" type="datetimeFigureOut">
               <a:rPr lang="en-US" smtClean="0"/>
-              <a:t>2/12/2020</a:t>
+              <a:t>2/14/2020</a:t>
             </a:fld>
             <a:endParaRPr lang="en-US"/>
           </a:p>
@@ -3265,7 +3268,7 @@
           <a:p>
             <a:fld id="{99D6FCD8-25CF-486E-8539-B907BB6A0B30}" type="datetimeFigureOut">
               <a:rPr lang="en-US" smtClean="0"/>
-              <a:t>2/12/2020</a:t>
+              <a:t>2/14/2020</a:t>
             </a:fld>
             <a:endParaRPr lang="en-US"/>
           </a:p>
@@ -4210,6 +4213,1007 @@
     <p:extLst>
       <p:ext uri="{BB962C8B-B14F-4D97-AF65-F5344CB8AC3E}">
         <p14:creationId xmlns:p14="http://schemas.microsoft.com/office/powerpoint/2010/main" val="3692965797"/>
+      </p:ext>
+    </p:extLst>
+  </p:cSld>
+  <p:clrMapOvr>
+    <a:masterClrMapping/>
+  </p:clrMapOvr>
+</p:sld>
+</file>
+
+<file path=ppt/slides/slide6.xml><?xml version="1.0" encoding="utf-8"?>
+<p:sld xmlns:a="http://schemas.openxmlformats.org/drawingml/2006/main" xmlns:r="http://schemas.openxmlformats.org/officeDocument/2006/relationships" xmlns:p="http://schemas.openxmlformats.org/presentationml/2006/main">
+  <p:cSld>
+    <p:spTree>
+      <p:nvGrpSpPr>
+        <p:cNvPr id="1" name=""/>
+        <p:cNvGrpSpPr/>
+        <p:nvPr/>
+      </p:nvGrpSpPr>
+      <p:grpSpPr>
+        <a:xfrm>
+          <a:off x="0" y="0"/>
+          <a:ext cx="0" cy="0"/>
+          <a:chOff x="0" y="0"/>
+          <a:chExt cx="0" cy="0"/>
+        </a:xfrm>
+      </p:grpSpPr>
+      <p:pic>
+        <p:nvPicPr>
+          <p:cNvPr id="7" name="Picture 6">
+            <a:extLst>
+              <a:ext uri="{FF2B5EF4-FFF2-40B4-BE49-F238E27FC236}">
+                <a16:creationId xmlns:a16="http://schemas.microsoft.com/office/drawing/2014/main" id="{BF6CF1F7-E81A-4436-BD91-B3E03D1F8165}"/>
+              </a:ext>
+            </a:extLst>
+          </p:cNvPr>
+          <p:cNvPicPr>
+            <a:picLocks noChangeAspect="1"/>
+          </p:cNvPicPr>
+          <p:nvPr/>
+        </p:nvPicPr>
+        <p:blipFill>
+          <a:blip r:embed="rId2"/>
+          <a:stretch>
+            <a:fillRect/>
+          </a:stretch>
+        </p:blipFill>
+        <p:spPr>
+          <a:xfrm>
+            <a:off x="0" y="0"/>
+            <a:ext cx="4114286" cy="2923809"/>
+          </a:xfrm>
+          <a:prstGeom prst="rect">
+            <a:avLst/>
+          </a:prstGeom>
+        </p:spPr>
+      </p:pic>
+      <p:pic>
+        <p:nvPicPr>
+          <p:cNvPr id="11" name="Picture 10">
+            <a:extLst>
+              <a:ext uri="{FF2B5EF4-FFF2-40B4-BE49-F238E27FC236}">
+                <a16:creationId xmlns:a16="http://schemas.microsoft.com/office/drawing/2014/main" id="{4EF62392-1E55-42DD-9DAF-6D5662EC8AE6}"/>
+              </a:ext>
+            </a:extLst>
+          </p:cNvPr>
+          <p:cNvPicPr>
+            <a:picLocks noChangeAspect="1"/>
+          </p:cNvPicPr>
+          <p:nvPr/>
+        </p:nvPicPr>
+        <p:blipFill>
+          <a:blip r:embed="rId3"/>
+          <a:stretch>
+            <a:fillRect/>
+          </a:stretch>
+        </p:blipFill>
+        <p:spPr>
+          <a:xfrm>
+            <a:off x="6520104" y="0"/>
+            <a:ext cx="4114286" cy="2923809"/>
+          </a:xfrm>
+          <a:prstGeom prst="rect">
+            <a:avLst/>
+          </a:prstGeom>
+        </p:spPr>
+      </p:pic>
+      <p:pic>
+        <p:nvPicPr>
+          <p:cNvPr id="13" name="Picture 12">
+            <a:extLst>
+              <a:ext uri="{FF2B5EF4-FFF2-40B4-BE49-F238E27FC236}">
+                <a16:creationId xmlns:a16="http://schemas.microsoft.com/office/drawing/2014/main" id="{3BA7F326-DDC5-473A-A4E3-C0F437794133}"/>
+              </a:ext>
+            </a:extLst>
+          </p:cNvPr>
+          <p:cNvPicPr>
+            <a:picLocks noChangeAspect="1"/>
+          </p:cNvPicPr>
+          <p:nvPr/>
+        </p:nvPicPr>
+        <p:blipFill>
+          <a:blip r:embed="rId4"/>
+          <a:stretch>
+            <a:fillRect/>
+          </a:stretch>
+        </p:blipFill>
+        <p:spPr>
+          <a:xfrm>
+            <a:off x="0" y="2923809"/>
+            <a:ext cx="4114286" cy="2923809"/>
+          </a:xfrm>
+          <a:prstGeom prst="rect">
+            <a:avLst/>
+          </a:prstGeom>
+        </p:spPr>
+      </p:pic>
+      <p:pic>
+        <p:nvPicPr>
+          <p:cNvPr id="17" name="Picture 16">
+            <a:extLst>
+              <a:ext uri="{FF2B5EF4-FFF2-40B4-BE49-F238E27FC236}">
+                <a16:creationId xmlns:a16="http://schemas.microsoft.com/office/drawing/2014/main" id="{A67D3072-4A22-4EFA-8121-A7D571C1B5A8}"/>
+              </a:ext>
+            </a:extLst>
+          </p:cNvPr>
+          <p:cNvPicPr>
+            <a:picLocks noChangeAspect="1"/>
+          </p:cNvPicPr>
+          <p:nvPr/>
+        </p:nvPicPr>
+        <p:blipFill>
+          <a:blip r:embed="rId5"/>
+          <a:stretch>
+            <a:fillRect/>
+          </a:stretch>
+        </p:blipFill>
+        <p:spPr>
+          <a:xfrm>
+            <a:off x="6520104" y="2923809"/>
+            <a:ext cx="4114286" cy="2923809"/>
+          </a:xfrm>
+          <a:prstGeom prst="rect">
+            <a:avLst/>
+          </a:prstGeom>
+        </p:spPr>
+      </p:pic>
+    </p:spTree>
+    <p:extLst>
+      <p:ext uri="{BB962C8B-B14F-4D97-AF65-F5344CB8AC3E}">
+        <p14:creationId xmlns:p14="http://schemas.microsoft.com/office/powerpoint/2010/main" val="501913389"/>
+      </p:ext>
+    </p:extLst>
+  </p:cSld>
+  <p:clrMapOvr>
+    <a:masterClrMapping/>
+  </p:clrMapOvr>
+</p:sld>
+</file>
+
+<file path=ppt/slides/slide7.xml><?xml version="1.0" encoding="utf-8"?>
+<p:sld xmlns:a="http://schemas.openxmlformats.org/drawingml/2006/main" xmlns:r="http://schemas.openxmlformats.org/officeDocument/2006/relationships" xmlns:p="http://schemas.openxmlformats.org/presentationml/2006/main">
+  <p:cSld>
+    <p:spTree>
+      <p:nvGrpSpPr>
+        <p:cNvPr id="1" name=""/>
+        <p:cNvGrpSpPr/>
+        <p:nvPr/>
+      </p:nvGrpSpPr>
+      <p:grpSpPr>
+        <a:xfrm>
+          <a:off x="0" y="0"/>
+          <a:ext cx="0" cy="0"/>
+          <a:chOff x="0" y="0"/>
+          <a:chExt cx="0" cy="0"/>
+        </a:xfrm>
+      </p:grpSpPr>
+      <p:sp>
+        <p:nvSpPr>
+          <p:cNvPr id="2" name="Title 1">
+            <a:extLst>
+              <a:ext uri="{FF2B5EF4-FFF2-40B4-BE49-F238E27FC236}">
+                <a16:creationId xmlns:a16="http://schemas.microsoft.com/office/drawing/2014/main" id="{445356FD-C5FF-4E45-BF58-B73A3B7FB4DC}"/>
+              </a:ext>
+            </a:extLst>
+          </p:cNvPr>
+          <p:cNvSpPr>
+            <a:spLocks noGrp="1"/>
+          </p:cNvSpPr>
+          <p:nvPr>
+            <p:ph type="title"/>
+          </p:nvPr>
+        </p:nvSpPr>
+        <p:spPr/>
+        <p:txBody>
+          <a:bodyPr/>
+          <a:lstStyle/>
+          <a:p>
+            <a:r>
+              <a:rPr lang="en-US" dirty="0" err="1"/>
+              <a:t>SingleR</a:t>
+            </a:r>
+            <a:r>
+              <a:rPr lang="en-US" dirty="0"/>
+              <a:t> annotation</a:t>
+            </a:r>
+          </a:p>
+        </p:txBody>
+      </p:sp>
+      <p:sp>
+        <p:nvSpPr>
+          <p:cNvPr id="3" name="Content Placeholder 2">
+            <a:extLst>
+              <a:ext uri="{FF2B5EF4-FFF2-40B4-BE49-F238E27FC236}">
+                <a16:creationId xmlns:a16="http://schemas.microsoft.com/office/drawing/2014/main" id="{96091699-2288-4424-A05C-AA3C8EC49AFB}"/>
+              </a:ext>
+            </a:extLst>
+          </p:cNvPr>
+          <p:cNvSpPr>
+            <a:spLocks noGrp="1"/>
+          </p:cNvSpPr>
+          <p:nvPr>
+            <p:ph sz="half" idx="1"/>
+          </p:nvPr>
+        </p:nvSpPr>
+        <p:spPr/>
+        <p:txBody>
+          <a:bodyPr/>
+          <a:lstStyle/>
+          <a:p>
+            <a:r>
+              <a:rPr lang="en-US" dirty="0"/>
+              <a:t>Most common cell types are:</a:t>
+            </a:r>
+          </a:p>
+          <a:p>
+            <a:pPr lvl="1"/>
+            <a:r>
+              <a:rPr lang="en-US" dirty="0"/>
+              <a:t>blue “Mesangial cells”</a:t>
+            </a:r>
+          </a:p>
+          <a:p>
+            <a:pPr lvl="1"/>
+            <a:r>
+              <a:rPr lang="en-US" dirty="0"/>
+              <a:t>green “Epithelial cells”</a:t>
+            </a:r>
+          </a:p>
+          <a:p>
+            <a:pPr lvl="1"/>
+            <a:r>
+              <a:rPr lang="en-US" dirty="0"/>
+              <a:t>red “Adipocytes”</a:t>
+            </a:r>
+          </a:p>
+          <a:p>
+            <a:r>
+              <a:rPr lang="en-US" dirty="0"/>
+              <a:t>What are the cancer markers?</a:t>
+            </a:r>
+          </a:p>
+        </p:txBody>
+      </p:sp>
+      <p:pic>
+        <p:nvPicPr>
+          <p:cNvPr id="6" name="Content Placeholder 5">
+            <a:extLst>
+              <a:ext uri="{FF2B5EF4-FFF2-40B4-BE49-F238E27FC236}">
+                <a16:creationId xmlns:a16="http://schemas.microsoft.com/office/drawing/2014/main" id="{887E00D0-C26F-43DB-AB06-9729F1A27E93}"/>
+              </a:ext>
+            </a:extLst>
+          </p:cNvPr>
+          <p:cNvPicPr>
+            <a:picLocks noGrp="1" noChangeAspect="1"/>
+          </p:cNvPicPr>
+          <p:nvPr>
+            <p:ph sz="half" idx="2"/>
+          </p:nvPr>
+        </p:nvPicPr>
+        <p:blipFill>
+          <a:blip r:embed="rId2"/>
+          <a:stretch>
+            <a:fillRect/>
+          </a:stretch>
+        </p:blipFill>
+        <p:spPr>
+          <a:xfrm>
+            <a:off x="6172200" y="2139257"/>
+            <a:ext cx="5181600" cy="3724074"/>
+          </a:xfrm>
+          <a:prstGeom prst="rect">
+            <a:avLst/>
+          </a:prstGeom>
+        </p:spPr>
+      </p:pic>
+    </p:spTree>
+    <p:extLst>
+      <p:ext uri="{BB962C8B-B14F-4D97-AF65-F5344CB8AC3E}">
+        <p14:creationId xmlns:p14="http://schemas.microsoft.com/office/powerpoint/2010/main" val="1788841914"/>
+      </p:ext>
+    </p:extLst>
+  </p:cSld>
+  <p:clrMapOvr>
+    <a:masterClrMapping/>
+  </p:clrMapOvr>
+</p:sld>
+</file>
+
+<file path=ppt/slides/slide8.xml><?xml version="1.0" encoding="utf-8"?>
+<p:sld xmlns:a="http://schemas.openxmlformats.org/drawingml/2006/main" xmlns:r="http://schemas.openxmlformats.org/officeDocument/2006/relationships" xmlns:p="http://schemas.openxmlformats.org/presentationml/2006/main">
+  <p:cSld>
+    <p:spTree>
+      <p:nvGrpSpPr>
+        <p:cNvPr id="1" name=""/>
+        <p:cNvGrpSpPr/>
+        <p:nvPr/>
+      </p:nvGrpSpPr>
+      <p:grpSpPr>
+        <a:xfrm>
+          <a:off x="0" y="0"/>
+          <a:ext cx="0" cy="0"/>
+          <a:chOff x="0" y="0"/>
+          <a:chExt cx="0" cy="0"/>
+        </a:xfrm>
+      </p:grpSpPr>
+      <p:sp>
+        <p:nvSpPr>
+          <p:cNvPr id="2" name="Title 1">
+            <a:extLst>
+              <a:ext uri="{FF2B5EF4-FFF2-40B4-BE49-F238E27FC236}">
+                <a16:creationId xmlns:a16="http://schemas.microsoft.com/office/drawing/2014/main" id="{07097830-02D4-4663-B3FC-4CBD7248C29D}"/>
+              </a:ext>
+            </a:extLst>
+          </p:cNvPr>
+          <p:cNvSpPr>
+            <a:spLocks noGrp="1"/>
+          </p:cNvSpPr>
+          <p:nvPr>
+            <p:ph type="title"/>
+          </p:nvPr>
+        </p:nvSpPr>
+        <p:spPr/>
+        <p:txBody>
+          <a:bodyPr/>
+          <a:lstStyle/>
+          <a:p>
+            <a:r>
+              <a:rPr lang="en-US" dirty="0"/>
+              <a:t>Deconvolution</a:t>
+            </a:r>
+          </a:p>
+        </p:txBody>
+      </p:sp>
+      <p:sp>
+        <p:nvSpPr>
+          <p:cNvPr id="7" name="Right Triangle 6">
+            <a:extLst>
+              <a:ext uri="{FF2B5EF4-FFF2-40B4-BE49-F238E27FC236}">
+                <a16:creationId xmlns:a16="http://schemas.microsoft.com/office/drawing/2014/main" id="{5EA0FB21-757F-4ED9-A39D-8652F2AB3BBF}"/>
+              </a:ext>
+            </a:extLst>
+          </p:cNvPr>
+          <p:cNvSpPr/>
+          <p:nvPr/>
+        </p:nvSpPr>
+        <p:spPr>
+          <a:xfrm>
+            <a:off x="2309091" y="2687782"/>
+            <a:ext cx="942109" cy="942109"/>
+          </a:xfrm>
+          <a:prstGeom prst="rtTriangle">
+            <a:avLst/>
+          </a:prstGeom>
+        </p:spPr>
+        <p:style>
+          <a:lnRef idx="2">
+            <a:schemeClr val="accent1">
+              <a:shade val="50000"/>
+            </a:schemeClr>
+          </a:lnRef>
+          <a:fillRef idx="1">
+            <a:schemeClr val="accent1"/>
+          </a:fillRef>
+          <a:effectRef idx="0">
+            <a:schemeClr val="accent1"/>
+          </a:effectRef>
+          <a:fontRef idx="minor">
+            <a:schemeClr val="lt1"/>
+          </a:fontRef>
+        </p:style>
+        <p:txBody>
+          <a:bodyPr rtlCol="0" anchor="ctr"/>
+          <a:lstStyle/>
+          <a:p>
+            <a:pPr algn="ctr"/>
+            <a:endParaRPr lang="en-US"/>
+          </a:p>
+        </p:txBody>
+      </p:sp>
+      <p:sp>
+        <p:nvSpPr>
+          <p:cNvPr id="8" name="Right Triangle 7">
+            <a:extLst>
+              <a:ext uri="{FF2B5EF4-FFF2-40B4-BE49-F238E27FC236}">
+                <a16:creationId xmlns:a16="http://schemas.microsoft.com/office/drawing/2014/main" id="{3730961E-0A94-43EB-AE6F-9C07BA098A4B}"/>
+              </a:ext>
+            </a:extLst>
+          </p:cNvPr>
+          <p:cNvSpPr/>
+          <p:nvPr/>
+        </p:nvSpPr>
+        <p:spPr>
+          <a:xfrm flipH="1">
+            <a:off x="1339272" y="2687782"/>
+            <a:ext cx="942109" cy="942109"/>
+          </a:xfrm>
+          <a:prstGeom prst="rtTriangle">
+            <a:avLst/>
+          </a:prstGeom>
+        </p:spPr>
+        <p:style>
+          <a:lnRef idx="2">
+            <a:schemeClr val="accent1">
+              <a:shade val="50000"/>
+            </a:schemeClr>
+          </a:lnRef>
+          <a:fillRef idx="1">
+            <a:schemeClr val="accent1"/>
+          </a:fillRef>
+          <a:effectRef idx="0">
+            <a:schemeClr val="accent1"/>
+          </a:effectRef>
+          <a:fontRef idx="minor">
+            <a:schemeClr val="lt1"/>
+          </a:fontRef>
+        </p:style>
+        <p:txBody>
+          <a:bodyPr rtlCol="0" anchor="ctr"/>
+          <a:lstStyle/>
+          <a:p>
+            <a:pPr algn="ctr"/>
+            <a:endParaRPr lang="en-US"/>
+          </a:p>
+        </p:txBody>
+      </p:sp>
+      <p:sp>
+        <p:nvSpPr>
+          <p:cNvPr id="9" name="Right Triangle 8">
+            <a:extLst>
+              <a:ext uri="{FF2B5EF4-FFF2-40B4-BE49-F238E27FC236}">
+                <a16:creationId xmlns:a16="http://schemas.microsoft.com/office/drawing/2014/main" id="{35C5BD35-F4B6-4E8D-9AFE-DC63C3330EBD}"/>
+              </a:ext>
+            </a:extLst>
+          </p:cNvPr>
+          <p:cNvSpPr/>
+          <p:nvPr/>
+        </p:nvSpPr>
+        <p:spPr>
+          <a:xfrm flipV="1">
+            <a:off x="2309091" y="3657167"/>
+            <a:ext cx="942109" cy="942109"/>
+          </a:xfrm>
+          <a:prstGeom prst="rtTriangle">
+            <a:avLst/>
+          </a:prstGeom>
+        </p:spPr>
+        <p:style>
+          <a:lnRef idx="2">
+            <a:schemeClr val="accent1">
+              <a:shade val="50000"/>
+            </a:schemeClr>
+          </a:lnRef>
+          <a:fillRef idx="1">
+            <a:schemeClr val="accent1"/>
+          </a:fillRef>
+          <a:effectRef idx="0">
+            <a:schemeClr val="accent1"/>
+          </a:effectRef>
+          <a:fontRef idx="minor">
+            <a:schemeClr val="lt1"/>
+          </a:fontRef>
+        </p:style>
+        <p:txBody>
+          <a:bodyPr rtlCol="0" anchor="ctr"/>
+          <a:lstStyle/>
+          <a:p>
+            <a:pPr algn="ctr"/>
+            <a:endParaRPr lang="en-US"/>
+          </a:p>
+        </p:txBody>
+      </p:sp>
+      <p:sp>
+        <p:nvSpPr>
+          <p:cNvPr id="10" name="Right Triangle 9">
+            <a:extLst>
+              <a:ext uri="{FF2B5EF4-FFF2-40B4-BE49-F238E27FC236}">
+                <a16:creationId xmlns:a16="http://schemas.microsoft.com/office/drawing/2014/main" id="{C9B531C9-D073-42C0-B0A0-3CF9D4574E8C}"/>
+              </a:ext>
+            </a:extLst>
+          </p:cNvPr>
+          <p:cNvSpPr/>
+          <p:nvPr/>
+        </p:nvSpPr>
+        <p:spPr>
+          <a:xfrm flipH="1" flipV="1">
+            <a:off x="1339272" y="3657167"/>
+            <a:ext cx="942109" cy="942109"/>
+          </a:xfrm>
+          <a:prstGeom prst="rtTriangle">
+            <a:avLst/>
+          </a:prstGeom>
+        </p:spPr>
+        <p:style>
+          <a:lnRef idx="2">
+            <a:schemeClr val="accent1">
+              <a:shade val="50000"/>
+            </a:schemeClr>
+          </a:lnRef>
+          <a:fillRef idx="1">
+            <a:schemeClr val="accent1"/>
+          </a:fillRef>
+          <a:effectRef idx="0">
+            <a:schemeClr val="accent1"/>
+          </a:effectRef>
+          <a:fontRef idx="minor">
+            <a:schemeClr val="lt1"/>
+          </a:fontRef>
+        </p:style>
+        <p:txBody>
+          <a:bodyPr rtlCol="0" anchor="ctr"/>
+          <a:lstStyle/>
+          <a:p>
+            <a:pPr algn="ctr"/>
+            <a:endParaRPr lang="en-US"/>
+          </a:p>
+        </p:txBody>
+      </p:sp>
+      <p:sp>
+        <p:nvSpPr>
+          <p:cNvPr id="11" name="Right Triangle 10">
+            <a:extLst>
+              <a:ext uri="{FF2B5EF4-FFF2-40B4-BE49-F238E27FC236}">
+                <a16:creationId xmlns:a16="http://schemas.microsoft.com/office/drawing/2014/main" id="{1F1A8EF6-0A01-4B95-96BB-96FB877FC47E}"/>
+              </a:ext>
+            </a:extLst>
+          </p:cNvPr>
+          <p:cNvSpPr/>
+          <p:nvPr/>
+        </p:nvSpPr>
+        <p:spPr>
+          <a:xfrm flipH="1" flipV="1">
+            <a:off x="2336801" y="2660506"/>
+            <a:ext cx="942109" cy="942109"/>
+          </a:xfrm>
+          <a:prstGeom prst="rtTriangle">
+            <a:avLst/>
+          </a:prstGeom>
+        </p:spPr>
+        <p:style>
+          <a:lnRef idx="2">
+            <a:schemeClr val="accent1">
+              <a:shade val="50000"/>
+            </a:schemeClr>
+          </a:lnRef>
+          <a:fillRef idx="1">
+            <a:schemeClr val="accent1"/>
+          </a:fillRef>
+          <a:effectRef idx="0">
+            <a:schemeClr val="accent1"/>
+          </a:effectRef>
+          <a:fontRef idx="minor">
+            <a:schemeClr val="lt1"/>
+          </a:fontRef>
+        </p:style>
+        <p:txBody>
+          <a:bodyPr rtlCol="0" anchor="ctr"/>
+          <a:lstStyle/>
+          <a:p>
+            <a:pPr algn="ctr"/>
+            <a:endParaRPr lang="en-US"/>
+          </a:p>
+        </p:txBody>
+      </p:sp>
+      <p:sp>
+        <p:nvSpPr>
+          <p:cNvPr id="12" name="Oval 11">
+            <a:extLst>
+              <a:ext uri="{FF2B5EF4-FFF2-40B4-BE49-F238E27FC236}">
+                <a16:creationId xmlns:a16="http://schemas.microsoft.com/office/drawing/2014/main" id="{F9A36781-AC04-4F40-8433-4A2008EB19D2}"/>
+              </a:ext>
+            </a:extLst>
+          </p:cNvPr>
+          <p:cNvSpPr/>
+          <p:nvPr/>
+        </p:nvSpPr>
+        <p:spPr>
+          <a:xfrm>
+            <a:off x="2184400" y="3546331"/>
+            <a:ext cx="221672" cy="221672"/>
+          </a:xfrm>
+          <a:prstGeom prst="ellipse">
+            <a:avLst/>
+          </a:prstGeom>
+        </p:spPr>
+        <p:style>
+          <a:lnRef idx="2">
+            <a:schemeClr val="accent2">
+              <a:shade val="50000"/>
+            </a:schemeClr>
+          </a:lnRef>
+          <a:fillRef idx="1">
+            <a:schemeClr val="accent2"/>
+          </a:fillRef>
+          <a:effectRef idx="0">
+            <a:schemeClr val="accent2"/>
+          </a:effectRef>
+          <a:fontRef idx="minor">
+            <a:schemeClr val="lt1"/>
+          </a:fontRef>
+        </p:style>
+        <p:txBody>
+          <a:bodyPr rtlCol="0" anchor="ctr"/>
+          <a:lstStyle/>
+          <a:p>
+            <a:pPr algn="ctr"/>
+            <a:endParaRPr lang="en-US"/>
+          </a:p>
+        </p:txBody>
+      </p:sp>
+      <p:sp>
+        <p:nvSpPr>
+          <p:cNvPr id="13" name="Oval 12">
+            <a:extLst>
+              <a:ext uri="{FF2B5EF4-FFF2-40B4-BE49-F238E27FC236}">
+                <a16:creationId xmlns:a16="http://schemas.microsoft.com/office/drawing/2014/main" id="{FE642889-6B21-4FF2-96D8-409C9F1296EB}"/>
+              </a:ext>
+            </a:extLst>
+          </p:cNvPr>
+          <p:cNvSpPr/>
+          <p:nvPr/>
+        </p:nvSpPr>
+        <p:spPr>
+          <a:xfrm>
+            <a:off x="3168074" y="2549670"/>
+            <a:ext cx="221672" cy="221672"/>
+          </a:xfrm>
+          <a:prstGeom prst="ellipse">
+            <a:avLst/>
+          </a:prstGeom>
+        </p:spPr>
+        <p:style>
+          <a:lnRef idx="2">
+            <a:schemeClr val="accent2">
+              <a:shade val="50000"/>
+            </a:schemeClr>
+          </a:lnRef>
+          <a:fillRef idx="1">
+            <a:schemeClr val="accent2"/>
+          </a:fillRef>
+          <a:effectRef idx="0">
+            <a:schemeClr val="accent2"/>
+          </a:effectRef>
+          <a:fontRef idx="minor">
+            <a:schemeClr val="lt1"/>
+          </a:fontRef>
+        </p:style>
+        <p:txBody>
+          <a:bodyPr rtlCol="0" anchor="ctr"/>
+          <a:lstStyle/>
+          <a:p>
+            <a:pPr algn="ctr"/>
+            <a:endParaRPr lang="en-US"/>
+          </a:p>
+        </p:txBody>
+      </p:sp>
+      <p:sp>
+        <p:nvSpPr>
+          <p:cNvPr id="14" name="Right Triangle 13">
+            <a:extLst>
+              <a:ext uri="{FF2B5EF4-FFF2-40B4-BE49-F238E27FC236}">
+                <a16:creationId xmlns:a16="http://schemas.microsoft.com/office/drawing/2014/main" id="{FDD7B147-C7EE-4C2F-8197-149B1007D319}"/>
+              </a:ext>
+            </a:extLst>
+          </p:cNvPr>
+          <p:cNvSpPr/>
+          <p:nvPr/>
+        </p:nvSpPr>
+        <p:spPr>
+          <a:xfrm>
+            <a:off x="6659418" y="2687782"/>
+            <a:ext cx="942109" cy="942109"/>
+          </a:xfrm>
+          <a:prstGeom prst="rtTriangle">
+            <a:avLst/>
+          </a:prstGeom>
+        </p:spPr>
+        <p:style>
+          <a:lnRef idx="2">
+            <a:schemeClr val="accent4">
+              <a:shade val="50000"/>
+            </a:schemeClr>
+          </a:lnRef>
+          <a:fillRef idx="1">
+            <a:schemeClr val="accent4"/>
+          </a:fillRef>
+          <a:effectRef idx="0">
+            <a:schemeClr val="accent4"/>
+          </a:effectRef>
+          <a:fontRef idx="minor">
+            <a:schemeClr val="lt1"/>
+          </a:fontRef>
+        </p:style>
+        <p:txBody>
+          <a:bodyPr rtlCol="0" anchor="ctr"/>
+          <a:lstStyle/>
+          <a:p>
+            <a:pPr algn="ctr"/>
+            <a:endParaRPr lang="en-US"/>
+          </a:p>
+        </p:txBody>
+      </p:sp>
+      <p:sp>
+        <p:nvSpPr>
+          <p:cNvPr id="15" name="Right Triangle 14">
+            <a:extLst>
+              <a:ext uri="{FF2B5EF4-FFF2-40B4-BE49-F238E27FC236}">
+                <a16:creationId xmlns:a16="http://schemas.microsoft.com/office/drawing/2014/main" id="{E6A9B841-D415-4A67-AC15-8856842EBDD5}"/>
+              </a:ext>
+            </a:extLst>
+          </p:cNvPr>
+          <p:cNvSpPr/>
+          <p:nvPr/>
+        </p:nvSpPr>
+        <p:spPr>
+          <a:xfrm flipH="1">
+            <a:off x="5689599" y="2687782"/>
+            <a:ext cx="942109" cy="942109"/>
+          </a:xfrm>
+          <a:prstGeom prst="rtTriangle">
+            <a:avLst/>
+          </a:prstGeom>
+        </p:spPr>
+        <p:style>
+          <a:lnRef idx="2">
+            <a:schemeClr val="accent6">
+              <a:shade val="50000"/>
+            </a:schemeClr>
+          </a:lnRef>
+          <a:fillRef idx="1">
+            <a:schemeClr val="accent6"/>
+          </a:fillRef>
+          <a:effectRef idx="0">
+            <a:schemeClr val="accent6"/>
+          </a:effectRef>
+          <a:fontRef idx="minor">
+            <a:schemeClr val="lt1"/>
+          </a:fontRef>
+        </p:style>
+        <p:txBody>
+          <a:bodyPr rtlCol="0" anchor="ctr"/>
+          <a:lstStyle/>
+          <a:p>
+            <a:pPr algn="ctr"/>
+            <a:endParaRPr lang="en-US"/>
+          </a:p>
+        </p:txBody>
+      </p:sp>
+      <p:sp>
+        <p:nvSpPr>
+          <p:cNvPr id="16" name="Right Triangle 15">
+            <a:extLst>
+              <a:ext uri="{FF2B5EF4-FFF2-40B4-BE49-F238E27FC236}">
+                <a16:creationId xmlns:a16="http://schemas.microsoft.com/office/drawing/2014/main" id="{69021FF0-3BF6-413A-8FFD-78126D69816C}"/>
+              </a:ext>
+            </a:extLst>
+          </p:cNvPr>
+          <p:cNvSpPr/>
+          <p:nvPr/>
+        </p:nvSpPr>
+        <p:spPr>
+          <a:xfrm flipV="1">
+            <a:off x="6659418" y="3657167"/>
+            <a:ext cx="942109" cy="942109"/>
+          </a:xfrm>
+          <a:prstGeom prst="rtTriangle">
+            <a:avLst/>
+          </a:prstGeom>
+        </p:spPr>
+        <p:style>
+          <a:lnRef idx="2">
+            <a:schemeClr val="accent6">
+              <a:shade val="50000"/>
+            </a:schemeClr>
+          </a:lnRef>
+          <a:fillRef idx="1">
+            <a:schemeClr val="accent6"/>
+          </a:fillRef>
+          <a:effectRef idx="0">
+            <a:schemeClr val="accent6"/>
+          </a:effectRef>
+          <a:fontRef idx="minor">
+            <a:schemeClr val="lt1"/>
+          </a:fontRef>
+        </p:style>
+        <p:txBody>
+          <a:bodyPr rtlCol="0" anchor="ctr"/>
+          <a:lstStyle/>
+          <a:p>
+            <a:pPr algn="ctr"/>
+            <a:endParaRPr lang="en-US"/>
+          </a:p>
+        </p:txBody>
+      </p:sp>
+      <p:sp>
+        <p:nvSpPr>
+          <p:cNvPr id="17" name="Right Triangle 16">
+            <a:extLst>
+              <a:ext uri="{FF2B5EF4-FFF2-40B4-BE49-F238E27FC236}">
+                <a16:creationId xmlns:a16="http://schemas.microsoft.com/office/drawing/2014/main" id="{242F2B75-1956-4604-8B35-1371655DBEC9}"/>
+              </a:ext>
+            </a:extLst>
+          </p:cNvPr>
+          <p:cNvSpPr/>
+          <p:nvPr/>
+        </p:nvSpPr>
+        <p:spPr>
+          <a:xfrm flipH="1" flipV="1">
+            <a:off x="5689599" y="3657167"/>
+            <a:ext cx="942109" cy="942109"/>
+          </a:xfrm>
+          <a:prstGeom prst="rtTriangle">
+            <a:avLst/>
+          </a:prstGeom>
+        </p:spPr>
+        <p:style>
+          <a:lnRef idx="2">
+            <a:schemeClr val="accent1">
+              <a:shade val="50000"/>
+            </a:schemeClr>
+          </a:lnRef>
+          <a:fillRef idx="1">
+            <a:schemeClr val="accent1"/>
+          </a:fillRef>
+          <a:effectRef idx="0">
+            <a:schemeClr val="accent1"/>
+          </a:effectRef>
+          <a:fontRef idx="minor">
+            <a:schemeClr val="lt1"/>
+          </a:fontRef>
+        </p:style>
+        <p:txBody>
+          <a:bodyPr rtlCol="0" anchor="ctr"/>
+          <a:lstStyle/>
+          <a:p>
+            <a:pPr algn="ctr"/>
+            <a:endParaRPr lang="en-US"/>
+          </a:p>
+        </p:txBody>
+      </p:sp>
+      <p:sp>
+        <p:nvSpPr>
+          <p:cNvPr id="18" name="Right Triangle 17">
+            <a:extLst>
+              <a:ext uri="{FF2B5EF4-FFF2-40B4-BE49-F238E27FC236}">
+                <a16:creationId xmlns:a16="http://schemas.microsoft.com/office/drawing/2014/main" id="{A7569928-6BBE-4F7D-8AC9-F0309F2CC791}"/>
+              </a:ext>
+            </a:extLst>
+          </p:cNvPr>
+          <p:cNvSpPr/>
+          <p:nvPr/>
+        </p:nvSpPr>
+        <p:spPr>
+          <a:xfrm flipH="1" flipV="1">
+            <a:off x="6687128" y="2660506"/>
+            <a:ext cx="942109" cy="942109"/>
+          </a:xfrm>
+          <a:prstGeom prst="rtTriangle">
+            <a:avLst/>
+          </a:prstGeom>
+        </p:spPr>
+        <p:style>
+          <a:lnRef idx="2">
+            <a:schemeClr val="accent6">
+              <a:shade val="50000"/>
+            </a:schemeClr>
+          </a:lnRef>
+          <a:fillRef idx="1">
+            <a:schemeClr val="accent6"/>
+          </a:fillRef>
+          <a:effectRef idx="0">
+            <a:schemeClr val="accent6"/>
+          </a:effectRef>
+          <a:fontRef idx="minor">
+            <a:schemeClr val="lt1"/>
+          </a:fontRef>
+        </p:style>
+        <p:txBody>
+          <a:bodyPr rtlCol="0" anchor="ctr"/>
+          <a:lstStyle/>
+          <a:p>
+            <a:pPr algn="ctr"/>
+            <a:endParaRPr lang="en-US"/>
+          </a:p>
+        </p:txBody>
+      </p:sp>
+      <p:sp>
+        <p:nvSpPr>
+          <p:cNvPr id="19" name="Oval 18">
+            <a:extLst>
+              <a:ext uri="{FF2B5EF4-FFF2-40B4-BE49-F238E27FC236}">
+                <a16:creationId xmlns:a16="http://schemas.microsoft.com/office/drawing/2014/main" id="{D23DFC3B-9A25-4153-B98D-AF6D2593D079}"/>
+              </a:ext>
+            </a:extLst>
+          </p:cNvPr>
+          <p:cNvSpPr/>
+          <p:nvPr/>
+        </p:nvSpPr>
+        <p:spPr>
+          <a:xfrm>
+            <a:off x="6534727" y="3546331"/>
+            <a:ext cx="221672" cy="221672"/>
+          </a:xfrm>
+          <a:prstGeom prst="ellipse">
+            <a:avLst/>
+          </a:prstGeom>
+        </p:spPr>
+        <p:style>
+          <a:lnRef idx="2">
+            <a:schemeClr val="accent2">
+              <a:shade val="50000"/>
+            </a:schemeClr>
+          </a:lnRef>
+          <a:fillRef idx="1">
+            <a:schemeClr val="accent2"/>
+          </a:fillRef>
+          <a:effectRef idx="0">
+            <a:schemeClr val="accent2"/>
+          </a:effectRef>
+          <a:fontRef idx="minor">
+            <a:schemeClr val="lt1"/>
+          </a:fontRef>
+        </p:style>
+        <p:txBody>
+          <a:bodyPr rtlCol="0" anchor="ctr"/>
+          <a:lstStyle/>
+          <a:p>
+            <a:pPr algn="ctr"/>
+            <a:endParaRPr lang="en-US"/>
+          </a:p>
+        </p:txBody>
+      </p:sp>
+      <p:sp>
+        <p:nvSpPr>
+          <p:cNvPr id="20" name="Oval 19">
+            <a:extLst>
+              <a:ext uri="{FF2B5EF4-FFF2-40B4-BE49-F238E27FC236}">
+                <a16:creationId xmlns:a16="http://schemas.microsoft.com/office/drawing/2014/main" id="{A673E713-2BA6-414D-B784-D522790471DF}"/>
+              </a:ext>
+            </a:extLst>
+          </p:cNvPr>
+          <p:cNvSpPr/>
+          <p:nvPr/>
+        </p:nvSpPr>
+        <p:spPr>
+          <a:xfrm>
+            <a:off x="7518401" y="2549670"/>
+            <a:ext cx="221672" cy="221672"/>
+          </a:xfrm>
+          <a:prstGeom prst="ellipse">
+            <a:avLst/>
+          </a:prstGeom>
+        </p:spPr>
+        <p:style>
+          <a:lnRef idx="2">
+            <a:schemeClr val="accent2">
+              <a:shade val="50000"/>
+            </a:schemeClr>
+          </a:lnRef>
+          <a:fillRef idx="1">
+            <a:schemeClr val="accent2"/>
+          </a:fillRef>
+          <a:effectRef idx="0">
+            <a:schemeClr val="accent2"/>
+          </a:effectRef>
+          <a:fontRef idx="minor">
+            <a:schemeClr val="lt1"/>
+          </a:fontRef>
+        </p:style>
+        <p:txBody>
+          <a:bodyPr rtlCol="0" anchor="ctr"/>
+          <a:lstStyle/>
+          <a:p>
+            <a:pPr algn="ctr"/>
+            <a:endParaRPr lang="en-US"/>
+          </a:p>
+        </p:txBody>
+      </p:sp>
+    </p:spTree>
+    <p:extLst>
+      <p:ext uri="{BB962C8B-B14F-4D97-AF65-F5344CB8AC3E}">
+        <p14:creationId xmlns:p14="http://schemas.microsoft.com/office/powerpoint/2010/main" val="2584111447"/>
       </p:ext>
     </p:extLst>
   </p:cSld>

</xml_diff>